<commit_message>
feat: Introduce web interface and refactor model explanation logic with enhanced SHAP and robust fallbacks.
</commit_message>
<xml_diff>
--- a/Docs/Ppt/Zeroth_Review_01.pptx
+++ b/Docs/Ppt/Zeroth_Review_01.pptx
@@ -390,7 +390,7 @@
             <a:fld id="{1D8BD707-D9CF-40AE-B4C6-C98DA3205C09}" type="datetimeFigureOut">
               <a:rPr lang="en-US" smtClean="0"/>
               <a:pPr/>
-              <a:t>11/21/2025</a:t>
+              <a:t>1/6/2026</a:t>
             </a:fld>
             <a:endParaRPr lang="en-US"/>
           </a:p>
@@ -555,7 +555,7 @@
             <a:fld id="{1D8BD707-D9CF-40AE-B4C6-C98DA3205C09}" type="datetimeFigureOut">
               <a:rPr lang="en-US" smtClean="0"/>
               <a:pPr/>
-              <a:t>11/21/2025</a:t>
+              <a:t>1/6/2026</a:t>
             </a:fld>
             <a:endParaRPr lang="en-US"/>
           </a:p>
@@ -730,7 +730,7 @@
             <a:fld id="{1D8BD707-D9CF-40AE-B4C6-C98DA3205C09}" type="datetimeFigureOut">
               <a:rPr lang="en-US" smtClean="0"/>
               <a:pPr/>
-              <a:t>11/21/2025</a:t>
+              <a:t>1/6/2026</a:t>
             </a:fld>
             <a:endParaRPr lang="en-US"/>
           </a:p>
@@ -895,7 +895,7 @@
             <a:fld id="{1D8BD707-D9CF-40AE-B4C6-C98DA3205C09}" type="datetimeFigureOut">
               <a:rPr lang="en-US" smtClean="0"/>
               <a:pPr/>
-              <a:t>11/21/2025</a:t>
+              <a:t>1/6/2026</a:t>
             </a:fld>
             <a:endParaRPr lang="en-US"/>
           </a:p>
@@ -1137,7 +1137,7 @@
             <a:fld id="{1D8BD707-D9CF-40AE-B4C6-C98DA3205C09}" type="datetimeFigureOut">
               <a:rPr lang="en-US" smtClean="0"/>
               <a:pPr/>
-              <a:t>11/21/2025</a:t>
+              <a:t>1/6/2026</a:t>
             </a:fld>
             <a:endParaRPr lang="en-US"/>
           </a:p>
@@ -1419,7 +1419,7 @@
             <a:fld id="{1D8BD707-D9CF-40AE-B4C6-C98DA3205C09}" type="datetimeFigureOut">
               <a:rPr lang="en-US" smtClean="0"/>
               <a:pPr/>
-              <a:t>11/21/2025</a:t>
+              <a:t>1/6/2026</a:t>
             </a:fld>
             <a:endParaRPr lang="en-US"/>
           </a:p>
@@ -1835,7 +1835,7 @@
             <a:fld id="{1D8BD707-D9CF-40AE-B4C6-C98DA3205C09}" type="datetimeFigureOut">
               <a:rPr lang="en-US" smtClean="0"/>
               <a:pPr/>
-              <a:t>11/21/2025</a:t>
+              <a:t>1/6/2026</a:t>
             </a:fld>
             <a:endParaRPr lang="en-US"/>
           </a:p>
@@ -1949,7 +1949,7 @@
             <a:fld id="{1D8BD707-D9CF-40AE-B4C6-C98DA3205C09}" type="datetimeFigureOut">
               <a:rPr lang="en-US" smtClean="0"/>
               <a:pPr/>
-              <a:t>11/21/2025</a:t>
+              <a:t>1/6/2026</a:t>
             </a:fld>
             <a:endParaRPr lang="en-US"/>
           </a:p>
@@ -2041,7 +2041,7 @@
             <a:fld id="{1D8BD707-D9CF-40AE-B4C6-C98DA3205C09}" type="datetimeFigureOut">
               <a:rPr lang="en-US" smtClean="0"/>
               <a:pPr/>
-              <a:t>11/21/2025</a:t>
+              <a:t>1/6/2026</a:t>
             </a:fld>
             <a:endParaRPr lang="en-US"/>
           </a:p>
@@ -2313,7 +2313,7 @@
             <a:fld id="{1D8BD707-D9CF-40AE-B4C6-C98DA3205C09}" type="datetimeFigureOut">
               <a:rPr lang="en-US" smtClean="0"/>
               <a:pPr/>
-              <a:t>11/21/2025</a:t>
+              <a:t>1/6/2026</a:t>
             </a:fld>
             <a:endParaRPr lang="en-US"/>
           </a:p>
@@ -2562,7 +2562,7 @@
             <a:fld id="{1D8BD707-D9CF-40AE-B4C6-C98DA3205C09}" type="datetimeFigureOut">
               <a:rPr lang="en-US" smtClean="0"/>
               <a:pPr/>
-              <a:t>11/21/2025</a:t>
+              <a:t>1/6/2026</a:t>
             </a:fld>
             <a:endParaRPr lang="en-US"/>
           </a:p>
@@ -2770,7 +2770,7 @@
             <a:fld id="{1D8BD707-D9CF-40AE-B4C6-C98DA3205C09}" type="datetimeFigureOut">
               <a:rPr lang="en-US" smtClean="0"/>
               <a:pPr/>
-              <a:t>11/21/2025</a:t>
+              <a:t>1/6/2026</a:t>
             </a:fld>
             <a:endParaRPr lang="en-US"/>
           </a:p>
@@ -4638,14 +4638,14 @@
           <p:nvPr>
             <p:extLst>
               <p:ext uri="{D42A27DB-BD31-4B8C-83A1-F6EECF244321}">
-                <p14:modId xmlns:p14="http://schemas.microsoft.com/office/powerpoint/2010/main" val="4141653713"/>
+                <p14:modId xmlns:p14="http://schemas.microsoft.com/office/powerpoint/2010/main" val="3998034035"/>
               </p:ext>
             </p:extLst>
           </p:nvPr>
         </p:nvGraphicFramePr>
         <p:xfrm>
-          <a:off x="457200" y="1076961"/>
-          <a:ext cx="8305800" cy="6009639"/>
+          <a:off x="660098" y="1076961"/>
+          <a:ext cx="8102902" cy="6009639"/>
         </p:xfrm>
         <a:graphic>
           <a:graphicData uri="http://schemas.openxmlformats.org/drawingml/2006/table">
@@ -4654,7 +4654,7 @@
                 <a:tableStyleId>{5C22544A-7EE6-4342-B048-85BDC9FD1C3A}</a:tableStyleId>
               </a:tblPr>
               <a:tblGrid>
-                <a:gridCol w="411178">
+                <a:gridCol w="208280">
                   <a:extLst>
                     <a:ext uri="{9D8B030D-6E8A-4147-A177-3AD203B41FA5}">
                       <a16:colId xmlns:a16="http://schemas.microsoft.com/office/drawing/2014/main" val="20000"/>

</xml_diff>